<commit_message>
update slides and code
update slides and code
</commit_message>
<xml_diff>
--- a/FullAutomationWithPowerShell/PowerShellAzureFullAuto.pptx
+++ b/FullAutomationWithPowerShell/PowerShellAzureFullAuto.pptx
@@ -5,7 +5,7 @@
     <p:sldMasterId id="2147483660" r:id="rId1"/>
   </p:sldMasterIdLst>
   <p:notesMasterIdLst>
-    <p:notesMasterId r:id="rId44"/>
+    <p:notesMasterId r:id="rId46"/>
   </p:notesMasterIdLst>
   <p:sldIdLst>
     <p:sldId id="364" r:id="rId2"/>
@@ -48,8 +48,10 @@
     <p:sldId id="369" r:id="rId39"/>
     <p:sldId id="391" r:id="rId40"/>
     <p:sldId id="377" r:id="rId41"/>
-    <p:sldId id="305" r:id="rId42"/>
-    <p:sldId id="309" r:id="rId43"/>
+    <p:sldId id="403" r:id="rId42"/>
+    <p:sldId id="404" r:id="rId43"/>
+    <p:sldId id="305" r:id="rId44"/>
+    <p:sldId id="309" r:id="rId45"/>
   </p:sldIdLst>
   <p:sldSz cx="12192000" cy="6858000"/>
   <p:notesSz cx="6858000" cy="9144000"/>
@@ -156,10 +158,6 @@
 </p:presentation>
 </file>
 
-<file path=ppt/revisionInfo.xml><?xml version="1.0" encoding="utf-8"?>
-<p1510:revInfo xmlns:a="http://schemas.openxmlformats.org/drawingml/2006/main" xmlns:r="http://schemas.openxmlformats.org/officeDocument/2006/relationships" xmlns:p1510="http://schemas.microsoft.com/office/powerpoint/2015/10/main"/>
-</file>
-
 <file path=ppt/notesMasters/notesMaster1.xml><?xml version="1.0" encoding="utf-8"?>
 <p:notesMaster xmlns:a="http://schemas.openxmlformats.org/drawingml/2006/main" xmlns:r="http://schemas.openxmlformats.org/officeDocument/2006/relationships" xmlns:p="http://schemas.openxmlformats.org/presentationml/2006/main">
   <p:cSld>
@@ -242,7 +240,7 @@
           <a:p>
             <a:fld id="{35E68EC4-A18A-4515-8D00-888390FF31A4}" type="datetimeFigureOut">
               <a:rPr lang="en-US" smtClean="0"/>
-              <a:t>2/19/2018</a:t>
+              <a:t>3/7/2018</a:t>
             </a:fld>
             <a:endParaRPr lang="en-US"/>
           </a:p>
@@ -647,7 +645,7 @@
           <a:p>
             <a:fld id="{3313C66B-7AF5-40BA-8933-D16874FF94CC}" type="datetime8">
               <a:rPr lang="en-US" smtClean="0"/>
-              <a:t>2/19/2018 1:53 PM</a:t>
+              <a:t>3/7/2018 7:55 AM</a:t>
             </a:fld>
             <a:endParaRPr lang="en-US" dirty="0"/>
           </a:p>
@@ -996,7 +994,7 @@
           <a:p>
             <a:fld id="{0C673344-19C1-4F3F-B3FC-900A05EF21EA}" type="datetime8">
               <a:rPr lang="en-US" smtClean="0"/>
-              <a:t>2/19/2018 1:53 PM</a:t>
+              <a:t>3/7/2018 7:56 AM</a:t>
             </a:fld>
             <a:endParaRPr lang="en-US" dirty="0"/>
           </a:p>
@@ -1177,7 +1175,7 @@
           <a:p>
             <a:fld id="{0C673344-19C1-4F3F-B3FC-900A05EF21EA}" type="datetime8">
               <a:rPr lang="en-US" smtClean="0"/>
-              <a:t>2/19/2018 1:53 PM</a:t>
+              <a:t>3/7/2018 7:56 AM</a:t>
             </a:fld>
             <a:endParaRPr lang="en-US" dirty="0"/>
           </a:p>
@@ -1358,7 +1356,7 @@
           <a:p>
             <a:fld id="{0C673344-19C1-4F3F-B3FC-900A05EF21EA}" type="datetime8">
               <a:rPr lang="en-US" smtClean="0"/>
-              <a:t>2/19/2018 1:53 PM</a:t>
+              <a:t>3/7/2018 7:56 AM</a:t>
             </a:fld>
             <a:endParaRPr lang="en-US" dirty="0"/>
           </a:p>
@@ -1539,7 +1537,7 @@
           <a:p>
             <a:fld id="{0C673344-19C1-4F3F-B3FC-900A05EF21EA}" type="datetime8">
               <a:rPr lang="en-US" smtClean="0"/>
-              <a:t>2/19/2018 3:06 PM</a:t>
+              <a:t>3/7/2018 7:56 AM</a:t>
             </a:fld>
             <a:endParaRPr lang="en-US" dirty="0"/>
           </a:p>
@@ -2392,7 +2390,7 @@
           <a:p>
             <a:fld id="{34FAA446-E61B-4D43-A3B1-7749AA6DC131}" type="datetime8">
               <a:rPr lang="en-US" smtClean="0"/>
-              <a:t>2/19/2018 2:46 PM</a:t>
+              <a:t>3/7/2018 7:56 AM</a:t>
             </a:fld>
             <a:endParaRPr lang="en-US" dirty="0"/>
           </a:p>
@@ -3917,7 +3915,7 @@
           <a:p>
             <a:fld id="{34FAA446-E61B-4D43-A3B1-7749AA6DC131}" type="datetime8">
               <a:rPr lang="en-US" smtClean="0"/>
-              <a:t>2/19/2018 2:29 PM</a:t>
+              <a:t>3/7/2018 7:56 AM</a:t>
             </a:fld>
             <a:endParaRPr lang="en-US" dirty="0"/>
           </a:p>
@@ -4182,7 +4180,7 @@
           <a:p>
             <a:fld id="{34FAA446-E61B-4D43-A3B1-7749AA6DC131}" type="datetime8">
               <a:rPr lang="en-US" smtClean="0"/>
-              <a:t>2/19/2018 1:53 PM</a:t>
+              <a:t>3/7/2018 7:56 AM</a:t>
             </a:fld>
             <a:endParaRPr lang="en-US" dirty="0"/>
           </a:p>
@@ -4275,12 +4273,12 @@
       </p:sp>
       <p:sp>
         <p:nvSpPr>
-          <p:cNvPr id="4" name="Slide Number Placeholder 3"/>
+          <p:cNvPr id="4" name="Header Placeholder 3"/>
           <p:cNvSpPr>
             <a:spLocks noGrp="1"/>
           </p:cNvSpPr>
           <p:nvPr>
-            <p:ph type="sldNum" sz="quarter" idx="10"/>
+            <p:ph type="hdr" sz="quarter" idx="10"/>
           </p:nvPr>
         </p:nvSpPr>
         <p:spPr/>
@@ -4288,18 +4286,115 @@
           <a:bodyPr/>
           <a:lstStyle/>
           <a:p>
-            <a:fld id="{61E97053-88AD-40B6-87D4-5337848C12B0}" type="slidenum">
+            <a:endParaRPr lang="en-US" dirty="0"/>
+          </a:p>
+        </p:txBody>
+      </p:sp>
+      <p:sp>
+        <p:nvSpPr>
+          <p:cNvPr id="5" name="Footer Placeholder 4"/>
+          <p:cNvSpPr>
+            <a:spLocks noGrp="1"/>
+          </p:cNvSpPr>
+          <p:nvPr>
+            <p:ph type="ftr" sz="quarter" idx="11"/>
+          </p:nvPr>
+        </p:nvSpPr>
+        <p:spPr/>
+        <p:txBody>
+          <a:bodyPr/>
+          <a:lstStyle/>
+          <a:p>
+            <a:pPr defTabSz="914099" eaLnBrk="0" hangingPunct="0"/>
+            <a:r>
+              <a:rPr lang="en-US" sz="400">
+                <a:gradFill>
+                  <a:gsLst>
+                    <a:gs pos="0">
+                      <a:prstClr val="black"/>
+                    </a:gs>
+                    <a:gs pos="100000">
+                      <a:prstClr val="black"/>
+                    </a:gs>
+                  </a:gsLst>
+                  <a:lin ang="5400000" scaled="0"/>
+                </a:gradFill>
+                <a:latin typeface="Segoe UI" pitchFamily="34" charset="0"/>
+                <a:ea typeface="Segoe UI" pitchFamily="34" charset="0"/>
+                <a:cs typeface="Segoe UI" pitchFamily="34" charset="0"/>
+              </a:rPr>
+              <a:t>© Microsoft Corporation. All rights reserved. MICROSOFT MAKES NO WARRANTIES, EXPRESS, IMPLIED OR STATUTORY, AS TO THE INFORMATION IN THIS PRESENTATION.</a:t>
+            </a:r>
+            <a:endParaRPr lang="en-US" sz="400" dirty="0">
+              <a:gradFill>
+                <a:gsLst>
+                  <a:gs pos="0">
+                    <a:prstClr val="black"/>
+                  </a:gs>
+                  <a:gs pos="100000">
+                    <a:prstClr val="black"/>
+                  </a:gs>
+                </a:gsLst>
+                <a:lin ang="5400000" scaled="0"/>
+              </a:gradFill>
+              <a:latin typeface="Segoe UI" pitchFamily="34" charset="0"/>
+              <a:ea typeface="Segoe UI" pitchFamily="34" charset="0"/>
+              <a:cs typeface="Segoe UI" pitchFamily="34" charset="0"/>
+            </a:endParaRPr>
+          </a:p>
+        </p:txBody>
+      </p:sp>
+      <p:sp>
+        <p:nvSpPr>
+          <p:cNvPr id="6" name="Date Placeholder 5"/>
+          <p:cNvSpPr>
+            <a:spLocks noGrp="1"/>
+          </p:cNvSpPr>
+          <p:nvPr>
+            <p:ph type="dt" idx="12"/>
+          </p:nvPr>
+        </p:nvSpPr>
+        <p:spPr/>
+        <p:txBody>
+          <a:bodyPr/>
+          <a:lstStyle/>
+          <a:p>
+            <a:fld id="{34FAA446-E61B-4D43-A3B1-7749AA6DC131}" type="datetime8">
               <a:rPr lang="en-US" smtClean="0"/>
+              <a:t>3/7/2018 8:11 AM</a:t>
+            </a:fld>
+            <a:endParaRPr lang="en-US" dirty="0"/>
+          </a:p>
+        </p:txBody>
+      </p:sp>
+      <p:sp>
+        <p:nvSpPr>
+          <p:cNvPr id="7" name="Slide Number Placeholder 6"/>
+          <p:cNvSpPr>
+            <a:spLocks noGrp="1"/>
+          </p:cNvSpPr>
+          <p:nvPr>
+            <p:ph type="sldNum" sz="quarter" idx="13"/>
+          </p:nvPr>
+        </p:nvSpPr>
+        <p:spPr/>
+        <p:txBody>
+          <a:bodyPr/>
+          <a:lstStyle/>
+          <a:p>
+            <a:fld id="{B4008EB6-D09E-4580-8CD6-DDB14511944F}" type="slidenum">
+              <a:rPr lang="en-US" smtClean="0"/>
+              <a:pPr/>
               <a:t>41</a:t>
             </a:fld>
-            <a:endParaRPr lang="en-US"/>
+            <a:endParaRPr lang="en-US" dirty="0"/>
           </a:p>
         </p:txBody>
       </p:sp>
     </p:spTree>
     <p:extLst>
       <p:ext uri="{BB962C8B-B14F-4D97-AF65-F5344CB8AC3E}">
-        <p14:creationId xmlns:p14="http://schemas.microsoft.com/office/powerpoint/2010/main" val="3701616092"/>
+        <p14:creationId xmlns:p14="http://schemas.microsoft.com/office/powerpoint/2010/main" val="2230079048"/>
       </p:ext>
     </p:extLst>
   </p:cSld>
@@ -4359,6 +4454,187 @@
       </p:sp>
       <p:sp>
         <p:nvSpPr>
+          <p:cNvPr id="4" name="Header Placeholder 3"/>
+          <p:cNvSpPr>
+            <a:spLocks noGrp="1"/>
+          </p:cNvSpPr>
+          <p:nvPr>
+            <p:ph type="hdr" sz="quarter" idx="10"/>
+          </p:nvPr>
+        </p:nvSpPr>
+        <p:spPr/>
+        <p:txBody>
+          <a:bodyPr/>
+          <a:lstStyle/>
+          <a:p>
+            <a:endParaRPr lang="en-US" dirty="0"/>
+          </a:p>
+        </p:txBody>
+      </p:sp>
+      <p:sp>
+        <p:nvSpPr>
+          <p:cNvPr id="5" name="Footer Placeholder 4"/>
+          <p:cNvSpPr>
+            <a:spLocks noGrp="1"/>
+          </p:cNvSpPr>
+          <p:nvPr>
+            <p:ph type="ftr" sz="quarter" idx="11"/>
+          </p:nvPr>
+        </p:nvSpPr>
+        <p:spPr/>
+        <p:txBody>
+          <a:bodyPr/>
+          <a:lstStyle/>
+          <a:p>
+            <a:pPr defTabSz="914099" eaLnBrk="0" hangingPunct="0"/>
+            <a:r>
+              <a:rPr lang="en-US" sz="400">
+                <a:gradFill>
+                  <a:gsLst>
+                    <a:gs pos="0">
+                      <a:prstClr val="black"/>
+                    </a:gs>
+                    <a:gs pos="100000">
+                      <a:prstClr val="black"/>
+                    </a:gs>
+                  </a:gsLst>
+                  <a:lin ang="5400000" scaled="0"/>
+                </a:gradFill>
+                <a:latin typeface="Segoe UI" pitchFamily="34" charset="0"/>
+                <a:ea typeface="Segoe UI" pitchFamily="34" charset="0"/>
+                <a:cs typeface="Segoe UI" pitchFamily="34" charset="0"/>
+              </a:rPr>
+              <a:t>© Microsoft Corporation. All rights reserved. MICROSOFT MAKES NO WARRANTIES, EXPRESS, IMPLIED OR STATUTORY, AS TO THE INFORMATION IN THIS PRESENTATION.</a:t>
+            </a:r>
+            <a:endParaRPr lang="en-US" sz="400" dirty="0">
+              <a:gradFill>
+                <a:gsLst>
+                  <a:gs pos="0">
+                    <a:prstClr val="black"/>
+                  </a:gs>
+                  <a:gs pos="100000">
+                    <a:prstClr val="black"/>
+                  </a:gs>
+                </a:gsLst>
+                <a:lin ang="5400000" scaled="0"/>
+              </a:gradFill>
+              <a:latin typeface="Segoe UI" pitchFamily="34" charset="0"/>
+              <a:ea typeface="Segoe UI" pitchFamily="34" charset="0"/>
+              <a:cs typeface="Segoe UI" pitchFamily="34" charset="0"/>
+            </a:endParaRPr>
+          </a:p>
+        </p:txBody>
+      </p:sp>
+      <p:sp>
+        <p:nvSpPr>
+          <p:cNvPr id="6" name="Date Placeholder 5"/>
+          <p:cNvSpPr>
+            <a:spLocks noGrp="1"/>
+          </p:cNvSpPr>
+          <p:nvPr>
+            <p:ph type="dt" idx="12"/>
+          </p:nvPr>
+        </p:nvSpPr>
+        <p:spPr/>
+        <p:txBody>
+          <a:bodyPr/>
+          <a:lstStyle/>
+          <a:p>
+            <a:fld id="{34FAA446-E61B-4D43-A3B1-7749AA6DC131}" type="datetime8">
+              <a:rPr lang="en-US" smtClean="0"/>
+              <a:t>3/7/2018 8:13 AM</a:t>
+            </a:fld>
+            <a:endParaRPr lang="en-US" dirty="0"/>
+          </a:p>
+        </p:txBody>
+      </p:sp>
+      <p:sp>
+        <p:nvSpPr>
+          <p:cNvPr id="7" name="Slide Number Placeholder 6"/>
+          <p:cNvSpPr>
+            <a:spLocks noGrp="1"/>
+          </p:cNvSpPr>
+          <p:nvPr>
+            <p:ph type="sldNum" sz="quarter" idx="13"/>
+          </p:nvPr>
+        </p:nvSpPr>
+        <p:spPr/>
+        <p:txBody>
+          <a:bodyPr/>
+          <a:lstStyle/>
+          <a:p>
+            <a:fld id="{B4008EB6-D09E-4580-8CD6-DDB14511944F}" type="slidenum">
+              <a:rPr lang="en-US" smtClean="0"/>
+              <a:pPr/>
+              <a:t>42</a:t>
+            </a:fld>
+            <a:endParaRPr lang="en-US" dirty="0"/>
+          </a:p>
+        </p:txBody>
+      </p:sp>
+    </p:spTree>
+    <p:extLst>
+      <p:ext uri="{BB962C8B-B14F-4D97-AF65-F5344CB8AC3E}">
+        <p14:creationId xmlns:p14="http://schemas.microsoft.com/office/powerpoint/2010/main" val="447473278"/>
+      </p:ext>
+    </p:extLst>
+  </p:cSld>
+  <p:clrMapOvr>
+    <a:masterClrMapping/>
+  </p:clrMapOvr>
+</p:notes>
+</file>
+
+<file path=ppt/notesSlides/notesSlide43.xml><?xml version="1.0" encoding="utf-8"?>
+<p:notes xmlns:a="http://schemas.openxmlformats.org/drawingml/2006/main" xmlns:r="http://schemas.openxmlformats.org/officeDocument/2006/relationships" xmlns:p="http://schemas.openxmlformats.org/presentationml/2006/main">
+  <p:cSld>
+    <p:spTree>
+      <p:nvGrpSpPr>
+        <p:cNvPr id="1" name=""/>
+        <p:cNvGrpSpPr/>
+        <p:nvPr/>
+      </p:nvGrpSpPr>
+      <p:grpSpPr>
+        <a:xfrm>
+          <a:off x="0" y="0"/>
+          <a:ext cx="0" cy="0"/>
+          <a:chOff x="0" y="0"/>
+          <a:chExt cx="0" cy="0"/>
+        </a:xfrm>
+      </p:grpSpPr>
+      <p:sp>
+        <p:nvSpPr>
+          <p:cNvPr id="2" name="Slide Image Placeholder 1"/>
+          <p:cNvSpPr>
+            <a:spLocks noGrp="1" noRot="1" noChangeAspect="1"/>
+          </p:cNvSpPr>
+          <p:nvPr>
+            <p:ph type="sldImg"/>
+          </p:nvPr>
+        </p:nvSpPr>
+        <p:spPr/>
+      </p:sp>
+      <p:sp>
+        <p:nvSpPr>
+          <p:cNvPr id="3" name="Notes Placeholder 2"/>
+          <p:cNvSpPr>
+            <a:spLocks noGrp="1"/>
+          </p:cNvSpPr>
+          <p:nvPr>
+            <p:ph type="body" idx="1"/>
+          </p:nvPr>
+        </p:nvSpPr>
+        <p:spPr/>
+        <p:txBody>
+          <a:bodyPr/>
+          <a:lstStyle/>
+          <a:p>
+            <a:endParaRPr lang="en-US"/>
+          </a:p>
+        </p:txBody>
+      </p:sp>
+      <p:sp>
+        <p:nvSpPr>
           <p:cNvPr id="4" name="Slide Number Placeholder 3"/>
           <p:cNvSpPr>
             <a:spLocks noGrp="1"/>
@@ -4374,7 +4650,91 @@
           <a:p>
             <a:fld id="{61E97053-88AD-40B6-87D4-5337848C12B0}" type="slidenum">
               <a:rPr lang="en-US" smtClean="0"/>
-              <a:t>42</a:t>
+              <a:t>43</a:t>
+            </a:fld>
+            <a:endParaRPr lang="en-US"/>
+          </a:p>
+        </p:txBody>
+      </p:sp>
+    </p:spTree>
+    <p:extLst>
+      <p:ext uri="{BB962C8B-B14F-4D97-AF65-F5344CB8AC3E}">
+        <p14:creationId xmlns:p14="http://schemas.microsoft.com/office/powerpoint/2010/main" val="3701616092"/>
+      </p:ext>
+    </p:extLst>
+  </p:cSld>
+  <p:clrMapOvr>
+    <a:masterClrMapping/>
+  </p:clrMapOvr>
+</p:notes>
+</file>
+
+<file path=ppt/notesSlides/notesSlide44.xml><?xml version="1.0" encoding="utf-8"?>
+<p:notes xmlns:a="http://schemas.openxmlformats.org/drawingml/2006/main" xmlns:r="http://schemas.openxmlformats.org/officeDocument/2006/relationships" xmlns:p="http://schemas.openxmlformats.org/presentationml/2006/main">
+  <p:cSld>
+    <p:spTree>
+      <p:nvGrpSpPr>
+        <p:cNvPr id="1" name=""/>
+        <p:cNvGrpSpPr/>
+        <p:nvPr/>
+      </p:nvGrpSpPr>
+      <p:grpSpPr>
+        <a:xfrm>
+          <a:off x="0" y="0"/>
+          <a:ext cx="0" cy="0"/>
+          <a:chOff x="0" y="0"/>
+          <a:chExt cx="0" cy="0"/>
+        </a:xfrm>
+      </p:grpSpPr>
+      <p:sp>
+        <p:nvSpPr>
+          <p:cNvPr id="2" name="Slide Image Placeholder 1"/>
+          <p:cNvSpPr>
+            <a:spLocks noGrp="1" noRot="1" noChangeAspect="1"/>
+          </p:cNvSpPr>
+          <p:nvPr>
+            <p:ph type="sldImg"/>
+          </p:nvPr>
+        </p:nvSpPr>
+        <p:spPr/>
+      </p:sp>
+      <p:sp>
+        <p:nvSpPr>
+          <p:cNvPr id="3" name="Notes Placeholder 2"/>
+          <p:cNvSpPr>
+            <a:spLocks noGrp="1"/>
+          </p:cNvSpPr>
+          <p:nvPr>
+            <p:ph type="body" idx="1"/>
+          </p:nvPr>
+        </p:nvSpPr>
+        <p:spPr/>
+        <p:txBody>
+          <a:bodyPr/>
+          <a:lstStyle/>
+          <a:p>
+            <a:endParaRPr lang="en-US"/>
+          </a:p>
+        </p:txBody>
+      </p:sp>
+      <p:sp>
+        <p:nvSpPr>
+          <p:cNvPr id="4" name="Slide Number Placeholder 3"/>
+          <p:cNvSpPr>
+            <a:spLocks noGrp="1"/>
+          </p:cNvSpPr>
+          <p:nvPr>
+            <p:ph type="sldNum" sz="quarter" idx="10"/>
+          </p:nvPr>
+        </p:nvSpPr>
+        <p:spPr/>
+        <p:txBody>
+          <a:bodyPr/>
+          <a:lstStyle/>
+          <a:p>
+            <a:fld id="{61E97053-88AD-40B6-87D4-5337848C12B0}" type="slidenum">
+              <a:rPr lang="en-US" smtClean="0"/>
+              <a:t>44</a:t>
             </a:fld>
             <a:endParaRPr lang="en-US"/>
           </a:p>
@@ -4783,7 +5143,7 @@
           <a:p>
             <a:fld id="{35A2D088-BDBD-41A5-ADCE-5C6A4DC08057}" type="datetime8">
               <a:rPr lang="en-US" smtClean="0"/>
-              <a:t>2/19/2018 1:53 PM</a:t>
+              <a:t>3/7/2018 7:56 AM</a:t>
             </a:fld>
             <a:endParaRPr lang="en-US" dirty="0"/>
           </a:p>
@@ -4917,7 +5277,7 @@
           <a:p>
             <a:fld id="{685711C6-D783-4789-8082-9D34F2C4221D}" type="datetime8">
               <a:rPr lang="en-US" smtClean="0"/>
-              <a:t>2/19/2018 1:53 PM</a:t>
+              <a:t>3/7/2018 7:56 AM</a:t>
             </a:fld>
             <a:endParaRPr lang="en-US" dirty="0"/>
           </a:p>
@@ -5275,7 +5635,7 @@
           <a:p>
             <a:fld id="{DC0AF5DC-DDEB-4F77-8204-FDACC6386AC0}" type="datetimeFigureOut">
               <a:rPr lang="en-US" smtClean="0"/>
-              <a:t>2/19/2018</a:t>
+              <a:t>3/7/2018</a:t>
             </a:fld>
             <a:endParaRPr lang="en-US"/>
           </a:p>
@@ -5507,7 +5867,7 @@
           <a:p>
             <a:fld id="{DC0AF5DC-DDEB-4F77-8204-FDACC6386AC0}" type="datetimeFigureOut">
               <a:rPr lang="en-US" smtClean="0"/>
-              <a:t>2/19/2018</a:t>
+              <a:t>3/7/2018</a:t>
             </a:fld>
             <a:endParaRPr lang="en-US"/>
           </a:p>
@@ -5787,7 +6147,7 @@
           <a:p>
             <a:fld id="{DC0AF5DC-DDEB-4F77-8204-FDACC6386AC0}" type="datetimeFigureOut">
               <a:rPr lang="en-US" smtClean="0"/>
-              <a:t>2/19/2018</a:t>
+              <a:t>3/7/2018</a:t>
             </a:fld>
             <a:endParaRPr lang="en-US"/>
           </a:p>
@@ -6775,7 +7135,7 @@
           <a:p>
             <a:fld id="{DC0AF5DC-DDEB-4F77-8204-FDACC6386AC0}" type="datetimeFigureOut">
               <a:rPr lang="en-US" smtClean="0"/>
-              <a:t>2/19/2018</a:t>
+              <a:t>3/7/2018</a:t>
             </a:fld>
             <a:endParaRPr lang="en-US"/>
           </a:p>
@@ -7074,7 +7434,7 @@
           <a:p>
             <a:fld id="{DC0AF5DC-DDEB-4F77-8204-FDACC6386AC0}" type="datetimeFigureOut">
               <a:rPr lang="en-US" smtClean="0"/>
-              <a:t>2/19/2018</a:t>
+              <a:t>3/7/2018</a:t>
             </a:fld>
             <a:endParaRPr lang="en-US"/>
           </a:p>
@@ -7477,7 +7837,7 @@
           <a:p>
             <a:fld id="{DC0AF5DC-DDEB-4F77-8204-FDACC6386AC0}" type="datetimeFigureOut">
               <a:rPr lang="en-US" smtClean="0"/>
-              <a:t>2/19/2018</a:t>
+              <a:t>3/7/2018</a:t>
             </a:fld>
             <a:endParaRPr lang="en-US"/>
           </a:p>
@@ -7619,7 +7979,7 @@
           <a:p>
             <a:fld id="{DC0AF5DC-DDEB-4F77-8204-FDACC6386AC0}" type="datetimeFigureOut">
               <a:rPr lang="en-US" smtClean="0"/>
-              <a:t>2/19/2018</a:t>
+              <a:t>3/7/2018</a:t>
             </a:fld>
             <a:endParaRPr lang="en-US"/>
           </a:p>
@@ -7814,7 +8174,7 @@
           <a:p>
             <a:fld id="{DC0AF5DC-DDEB-4F77-8204-FDACC6386AC0}" type="datetimeFigureOut">
               <a:rPr lang="en-US" smtClean="0"/>
-              <a:t>2/19/2018</a:t>
+              <a:t>3/7/2018</a:t>
             </a:fld>
             <a:endParaRPr lang="en-US"/>
           </a:p>
@@ -8187,7 +8547,7 @@
           <a:p>
             <a:fld id="{DC0AF5DC-DDEB-4F77-8204-FDACC6386AC0}" type="datetimeFigureOut">
               <a:rPr lang="en-US" smtClean="0"/>
-              <a:t>2/19/2018</a:t>
+              <a:t>3/7/2018</a:t>
             </a:fld>
             <a:endParaRPr lang="en-US"/>
           </a:p>
@@ -8588,7 +8948,7 @@
           <a:p>
             <a:fld id="{DC0AF5DC-DDEB-4F77-8204-FDACC6386AC0}" type="datetimeFigureOut">
               <a:rPr lang="en-US" smtClean="0"/>
-              <a:t>2/19/2018</a:t>
+              <a:t>3/7/2018</a:t>
             </a:fld>
             <a:endParaRPr lang="en-US"/>
           </a:p>
@@ -9238,91 +9598,6 @@
       </p:sp>
       <p:sp>
         <p:nvSpPr>
-          <p:cNvPr id="2" name="Rectangle 1">
-            <a:extLst>
-              <a:ext uri="{FF2B5EF4-FFF2-40B4-BE49-F238E27FC236}">
-                <a16:creationId xmlns:a16="http://schemas.microsoft.com/office/drawing/2014/main" id="{F9E35A6F-B7B2-4E2B-BA84-10F8D3CF604A}"/>
-              </a:ext>
-            </a:extLst>
-          </p:cNvPr>
-          <p:cNvSpPr/>
-          <p:nvPr/>
-        </p:nvSpPr>
-        <p:spPr>
-          <a:xfrm>
-            <a:off x="2520117" y="5839411"/>
-            <a:ext cx="4704493" cy="454420"/>
-          </a:xfrm>
-          <a:prstGeom prst="rect">
-            <a:avLst/>
-          </a:prstGeom>
-        </p:spPr>
-        <p:txBody>
-          <a:bodyPr wrap="none">
-            <a:spAutoFit/>
-          </a:bodyPr>
-          <a:lstStyle/>
-          <a:p>
-            <a:r>
-              <a:rPr lang="en-US" sz="2353" dirty="0">
-                <a:solidFill>
-                  <a:schemeClr val="bg1"/>
-                </a:solidFill>
-              </a:rPr>
-              <a:t>https://github.com/bcafferky/shared</a:t>
-            </a:r>
-          </a:p>
-        </p:txBody>
-      </p:sp>
-      <p:sp>
-        <p:nvSpPr>
-          <p:cNvPr id="6" name="TextBox 5">
-            <a:extLst>
-              <a:ext uri="{FF2B5EF4-FFF2-40B4-BE49-F238E27FC236}">
-                <a16:creationId xmlns:a16="http://schemas.microsoft.com/office/drawing/2014/main" id="{F22BC2C6-9177-40A8-B7BE-92D5DA520CE1}"/>
-              </a:ext>
-            </a:extLst>
-          </p:cNvPr>
-          <p:cNvSpPr txBox="1"/>
-          <p:nvPr/>
-        </p:nvSpPr>
-        <p:spPr>
-          <a:xfrm>
-            <a:off x="240117" y="5757944"/>
-            <a:ext cx="2186674" cy="615516"/>
-          </a:xfrm>
-          <a:prstGeom prst="rect">
-            <a:avLst/>
-          </a:prstGeom>
-          <a:noFill/>
-        </p:spPr>
-        <p:txBody>
-          <a:bodyPr wrap="none" lIns="179285" tIns="143428" rIns="179285" bIns="143428" rtlCol="0">
-            <a:spAutoFit/>
-          </a:bodyPr>
-          <a:lstStyle/>
-          <a:p>
-            <a:pPr>
-              <a:lnSpc>
-                <a:spcPct val="90000"/>
-              </a:lnSpc>
-              <a:spcAft>
-                <a:spcPts val="588"/>
-              </a:spcAft>
-            </a:pPr>
-            <a:r>
-              <a:rPr lang="en-US" sz="2353" dirty="0">
-                <a:solidFill>
-                  <a:schemeClr val="bg1"/>
-                </a:solidFill>
-              </a:rPr>
-              <a:t>Demo Code at:</a:t>
-            </a:r>
-          </a:p>
-        </p:txBody>
-      </p:sp>
-      <p:sp>
-        <p:nvSpPr>
           <p:cNvPr id="7" name="TextBox 6">
             <a:extLst>
               <a:ext uri="{FF2B5EF4-FFF2-40B4-BE49-F238E27FC236}">
@@ -9404,7 +9679,7 @@
         </p:blipFill>
         <p:spPr>
           <a:xfrm>
-            <a:off x="10254241" y="4539317"/>
+            <a:off x="10254240" y="4431665"/>
             <a:ext cx="1381125" cy="1381125"/>
           </a:xfrm>
           <a:prstGeom prst="rect">
@@ -9494,7 +9769,7 @@
         </p:blipFill>
         <p:spPr>
           <a:xfrm>
-            <a:off x="9916104" y="6110614"/>
+            <a:off x="9916102" y="5875269"/>
             <a:ext cx="2057400" cy="438150"/>
           </a:xfrm>
           <a:prstGeom prst="rect">
@@ -9505,6 +9780,91 @@
           </a:solidFill>
         </p:spPr>
       </p:pic>
+      <p:sp>
+        <p:nvSpPr>
+          <p:cNvPr id="6" name="TextBox 5">
+            <a:extLst>
+              <a:ext uri="{FF2B5EF4-FFF2-40B4-BE49-F238E27FC236}">
+                <a16:creationId xmlns:a16="http://schemas.microsoft.com/office/drawing/2014/main" id="{F22BC2C6-9177-40A8-B7BE-92D5DA520CE1}"/>
+              </a:ext>
+            </a:extLst>
+          </p:cNvPr>
+          <p:cNvSpPr txBox="1"/>
+          <p:nvPr/>
+        </p:nvSpPr>
+        <p:spPr>
+          <a:xfrm>
+            <a:off x="148787" y="6329689"/>
+            <a:ext cx="2186674" cy="615516"/>
+          </a:xfrm>
+          <a:prstGeom prst="rect">
+            <a:avLst/>
+          </a:prstGeom>
+          <a:noFill/>
+        </p:spPr>
+        <p:txBody>
+          <a:bodyPr wrap="none" lIns="179285" tIns="143428" rIns="179285" bIns="143428" rtlCol="0">
+            <a:spAutoFit/>
+          </a:bodyPr>
+          <a:lstStyle/>
+          <a:p>
+            <a:pPr>
+              <a:lnSpc>
+                <a:spcPct val="90000"/>
+              </a:lnSpc>
+              <a:spcAft>
+                <a:spcPts val="588"/>
+              </a:spcAft>
+            </a:pPr>
+            <a:r>
+              <a:rPr lang="en-US" sz="2353" dirty="0">
+                <a:solidFill>
+                  <a:schemeClr val="bg1"/>
+                </a:solidFill>
+              </a:rPr>
+              <a:t>Demo Code at:</a:t>
+            </a:r>
+          </a:p>
+        </p:txBody>
+      </p:sp>
+      <p:sp>
+        <p:nvSpPr>
+          <p:cNvPr id="2" name="Rectangle 1">
+            <a:extLst>
+              <a:ext uri="{FF2B5EF4-FFF2-40B4-BE49-F238E27FC236}">
+                <a16:creationId xmlns:a16="http://schemas.microsoft.com/office/drawing/2014/main" id="{F9E35A6F-B7B2-4E2B-BA84-10F8D3CF604A}"/>
+              </a:ext>
+            </a:extLst>
+          </p:cNvPr>
+          <p:cNvSpPr/>
+          <p:nvPr/>
+        </p:nvSpPr>
+        <p:spPr>
+          <a:xfrm>
+            <a:off x="2270825" y="6392168"/>
+            <a:ext cx="8673978" cy="454420"/>
+          </a:xfrm>
+          <a:prstGeom prst="rect">
+            <a:avLst/>
+          </a:prstGeom>
+        </p:spPr>
+        <p:txBody>
+          <a:bodyPr wrap="none">
+            <a:spAutoFit/>
+          </a:bodyPr>
+          <a:lstStyle/>
+          <a:p>
+            <a:r>
+              <a:rPr lang="en-US" sz="2353" dirty="0">
+                <a:solidFill>
+                  <a:schemeClr val="bg1"/>
+                </a:solidFill>
+              </a:rPr>
+              <a:t>https://github.com/bcafferky/shared/FullAutomationWithPowerShell</a:t>
+            </a:r>
+          </a:p>
+        </p:txBody>
+      </p:sp>
     </p:spTree>
     <p:extLst>
       <p:ext uri="{BB962C8B-B14F-4D97-AF65-F5344CB8AC3E}">
@@ -14196,6 +14556,42 @@
           </a:prstGeom>
         </p:spPr>
       </p:pic>
+      <p:pic>
+        <p:nvPicPr>
+          <p:cNvPr id="10" name="Picture 9">
+            <a:extLst>
+              <a:ext uri="{FF2B5EF4-FFF2-40B4-BE49-F238E27FC236}">
+                <a16:creationId xmlns:a16="http://schemas.microsoft.com/office/drawing/2014/main" id="{A4D015F6-5D52-4325-BEF5-A2A6D2D99078}"/>
+              </a:ext>
+            </a:extLst>
+          </p:cNvPr>
+          <p:cNvPicPr>
+            <a:picLocks noChangeAspect="1"/>
+          </p:cNvPicPr>
+          <p:nvPr/>
+        </p:nvPicPr>
+        <p:blipFill>
+          <a:blip r:embed="rId6">
+            <a:extLst>
+              <a:ext uri="{28A0092B-C50C-407E-A947-70E740481C1C}">
+                <a14:useLocalDpi xmlns:a14="http://schemas.microsoft.com/office/drawing/2010/main" val="0"/>
+              </a:ext>
+            </a:extLst>
+          </a:blip>
+          <a:stretch>
+            <a:fillRect/>
+          </a:stretch>
+        </p:blipFill>
+        <p:spPr>
+          <a:xfrm>
+            <a:off x="9987007" y="2580930"/>
+            <a:ext cx="843239" cy="843239"/>
+          </a:xfrm>
+          <a:prstGeom prst="rect">
+            <a:avLst/>
+          </a:prstGeom>
+        </p:spPr>
+      </p:pic>
     </p:spTree>
     <p:extLst>
       <p:ext uri="{BB962C8B-B14F-4D97-AF65-F5344CB8AC3E}">
@@ -18135,7 +18531,7 @@
             <a:pPr algn="ctr"/>
             <a:r>
               <a:rPr lang="en-US" sz="1600" dirty="0"/>
-              <a:t>Python Language</a:t>
+              <a:t>Python 2 Language</a:t>
             </a:r>
           </a:p>
         </p:txBody>
@@ -20087,7 +20483,7 @@
         </p:blipFill>
         <p:spPr bwMode="auto">
           <a:xfrm>
-            <a:off x="627869" y="560472"/>
+            <a:off x="698891" y="942212"/>
             <a:ext cx="11025905" cy="5737056"/>
           </a:xfrm>
           <a:prstGeom prst="rect">
@@ -20099,6 +20495,43 @@
           </a:ln>
         </p:spPr>
       </p:pic>
+      <p:sp>
+        <p:nvSpPr>
+          <p:cNvPr id="3" name="TextBox 2">
+            <a:extLst>
+              <a:ext uri="{FF2B5EF4-FFF2-40B4-BE49-F238E27FC236}">
+                <a16:creationId xmlns:a16="http://schemas.microsoft.com/office/drawing/2014/main" id="{0D51C910-6720-4B3A-AFA8-76C9B415B69B}"/>
+              </a:ext>
+            </a:extLst>
+          </p:cNvPr>
+          <p:cNvSpPr txBox="1"/>
+          <p:nvPr/>
+        </p:nvSpPr>
+        <p:spPr>
+          <a:xfrm>
+            <a:off x="2462136" y="153187"/>
+            <a:ext cx="7085016" cy="461665"/>
+          </a:xfrm>
+          <a:prstGeom prst="rect">
+            <a:avLst/>
+          </a:prstGeom>
+          <a:noFill/>
+        </p:spPr>
+        <p:txBody>
+          <a:bodyPr wrap="none" rtlCol="0">
+            <a:spAutoFit/>
+          </a:bodyPr>
+          <a:lstStyle/>
+          <a:p>
+            <a:r>
+              <a:rPr lang="en-US" sz="2400" dirty="0">
+                <a:latin typeface="Arial Black" panose="020B0A04020102020204" pitchFamily="34" charset="0"/>
+              </a:rPr>
+              <a:t>Automation Authoring Toolkit - Runbooks</a:t>
+            </a:r>
+          </a:p>
+        </p:txBody>
+      </p:sp>
     </p:spTree>
     <p:extLst>
       <p:ext uri="{BB962C8B-B14F-4D97-AF65-F5344CB8AC3E}">
@@ -20127,6 +20560,14 @@
 <file path=ppt/slides/slide41.xml><?xml version="1.0" encoding="utf-8"?>
 <p:sld xmlns:a="http://schemas.openxmlformats.org/drawingml/2006/main" xmlns:r="http://schemas.openxmlformats.org/officeDocument/2006/relationships" xmlns:p="http://schemas.openxmlformats.org/presentationml/2006/main">
   <p:cSld>
+    <p:bg>
+      <p:bgPr>
+        <a:solidFill>
+          <a:srgbClr val="00359E"/>
+        </a:solidFill>
+        <a:effectLst/>
+      </p:bgPr>
+    </p:bg>
     <p:spTree>
       <p:nvGrpSpPr>
         <p:cNvPr id="1" name=""/>
@@ -20141,26 +20582,104 @@
           <a:chExt cx="0" cy="0"/>
         </a:xfrm>
       </p:grpSpPr>
-      <p:sp>
-        <p:nvSpPr>
-          <p:cNvPr id="4" name="Rectangle 3"/>
+      <p:pic>
+        <p:nvPicPr>
+          <p:cNvPr id="3" name="Picture 2">
+            <a:extLst>
+              <a:ext uri="{FF2B5EF4-FFF2-40B4-BE49-F238E27FC236}">
+                <a16:creationId xmlns:a16="http://schemas.microsoft.com/office/drawing/2014/main" id="{D19360D5-4A43-4993-A52F-044460818102}"/>
+              </a:ext>
+            </a:extLst>
+          </p:cNvPr>
+          <p:cNvPicPr>
+            <a:picLocks noChangeAspect="1"/>
+          </p:cNvPicPr>
+          <p:nvPr/>
+        </p:nvPicPr>
+        <p:blipFill>
+          <a:blip r:embed="rId3"/>
+          <a:stretch>
+            <a:fillRect/>
+          </a:stretch>
+        </p:blipFill>
+        <p:spPr>
+          <a:xfrm>
+            <a:off x="1622903" y="650199"/>
+            <a:ext cx="8794665" cy="6074995"/>
+          </a:xfrm>
+          <a:prstGeom prst="rect">
+            <a:avLst/>
+          </a:prstGeom>
+        </p:spPr>
+      </p:pic>
+      <p:sp>
+        <p:nvSpPr>
+          <p:cNvPr id="4" name="TextBox 3">
+            <a:extLst>
+              <a:ext uri="{FF2B5EF4-FFF2-40B4-BE49-F238E27FC236}">
+                <a16:creationId xmlns:a16="http://schemas.microsoft.com/office/drawing/2014/main" id="{9C5FE0F2-C256-47F6-867A-0290E2CB9A23}"/>
+              </a:ext>
+            </a:extLst>
+          </p:cNvPr>
+          <p:cNvSpPr txBox="1"/>
+          <p:nvPr/>
+        </p:nvSpPr>
+        <p:spPr>
+          <a:xfrm>
+            <a:off x="2577546" y="99921"/>
+            <a:ext cx="6967228" cy="461665"/>
+          </a:xfrm>
+          <a:prstGeom prst="rect">
+            <a:avLst/>
+          </a:prstGeom>
+          <a:noFill/>
+        </p:spPr>
+        <p:txBody>
+          <a:bodyPr wrap="none" rtlCol="0">
+            <a:spAutoFit/>
+          </a:bodyPr>
+          <a:lstStyle/>
+          <a:p>
+            <a:r>
+              <a:rPr lang="en-US" sz="2400" dirty="0">
+                <a:latin typeface="Arial Black" panose="020B0A04020102020204" pitchFamily="34" charset="0"/>
+              </a:rPr>
+              <a:t>Automation Authoring Toolkit - Storage</a:t>
+            </a:r>
+          </a:p>
+        </p:txBody>
+      </p:sp>
+      <p:sp>
+        <p:nvSpPr>
+          <p:cNvPr id="5" name="Callout: Line 4">
+            <a:extLst>
+              <a:ext uri="{FF2B5EF4-FFF2-40B4-BE49-F238E27FC236}">
+                <a16:creationId xmlns:a16="http://schemas.microsoft.com/office/drawing/2014/main" id="{D7B195D7-339E-4BB6-A23E-4ECD78443D12}"/>
+              </a:ext>
+            </a:extLst>
+          </p:cNvPr>
           <p:cNvSpPr/>
           <p:nvPr/>
         </p:nvSpPr>
         <p:spPr>
           <a:xfrm>
-            <a:off x="0" y="872454"/>
-            <a:ext cx="12192000" cy="6123965"/>
-          </a:xfrm>
-          <a:prstGeom prst="rect">
-            <a:avLst/>
+            <a:off x="9960746" y="4385568"/>
+            <a:ext cx="1997476" cy="994299"/>
+          </a:xfrm>
+          <a:prstGeom prst="borderCallout1">
+            <a:avLst>
+              <a:gd name="adj1" fmla="val 18750"/>
+              <a:gd name="adj2" fmla="val -8333"/>
+              <a:gd name="adj3" fmla="val 150893"/>
+              <a:gd name="adj4" fmla="val -37444"/>
+            </a:avLst>
           </a:prstGeom>
           <a:solidFill>
-            <a:srgbClr val="00359E"/>
+            <a:srgbClr val="7030A0"/>
           </a:solidFill>
           <a:ln>
             <a:solidFill>
-              <a:srgbClr val="00359E"/>
+              <a:schemeClr val="bg1"/>
             </a:solidFill>
           </a:ln>
         </p:spPr>
@@ -20185,6 +20704,341 @@
           <a:lstStyle/>
           <a:p>
             <a:pPr algn="ctr"/>
+            <a:r>
+              <a:rPr lang="en-US" dirty="0"/>
+              <a:t>Must Create Azure Storage to Hold the Module</a:t>
+            </a:r>
+          </a:p>
+        </p:txBody>
+      </p:sp>
+      <p:sp>
+        <p:nvSpPr>
+          <p:cNvPr id="6" name="Callout: Line 5">
+            <a:extLst>
+              <a:ext uri="{FF2B5EF4-FFF2-40B4-BE49-F238E27FC236}">
+                <a16:creationId xmlns:a16="http://schemas.microsoft.com/office/drawing/2014/main" id="{BFCF33E4-9E3D-4141-BED4-8F94250F18E1}"/>
+              </a:ext>
+            </a:extLst>
+          </p:cNvPr>
+          <p:cNvSpPr/>
+          <p:nvPr/>
+        </p:nvSpPr>
+        <p:spPr>
+          <a:xfrm>
+            <a:off x="8420091" y="1873899"/>
+            <a:ext cx="3124209" cy="1166342"/>
+          </a:xfrm>
+          <a:prstGeom prst="borderCallout1">
+            <a:avLst>
+              <a:gd name="adj1" fmla="val 18750"/>
+              <a:gd name="adj2" fmla="val -8333"/>
+              <a:gd name="adj3" fmla="val 54189"/>
+              <a:gd name="adj4" fmla="val -80639"/>
+            </a:avLst>
+          </a:prstGeom>
+          <a:solidFill>
+            <a:srgbClr val="7030A0"/>
+          </a:solidFill>
+          <a:ln>
+            <a:solidFill>
+              <a:schemeClr val="bg1"/>
+            </a:solidFill>
+          </a:ln>
+        </p:spPr>
+        <p:style>
+          <a:lnRef idx="2">
+            <a:schemeClr val="accent1">
+              <a:shade val="50000"/>
+            </a:schemeClr>
+          </a:lnRef>
+          <a:fillRef idx="1">
+            <a:schemeClr val="accent1"/>
+          </a:fillRef>
+          <a:effectRef idx="0">
+            <a:schemeClr val="accent1"/>
+          </a:effectRef>
+          <a:fontRef idx="minor">
+            <a:schemeClr val="lt1"/>
+          </a:fontRef>
+        </p:style>
+        <p:txBody>
+          <a:bodyPr rtlCol="0" anchor="ctr"/>
+          <a:lstStyle/>
+          <a:p>
+            <a:pPr algn="ctr"/>
+            <a:r>
+              <a:rPr lang="en-US" dirty="0"/>
+              <a:t>No Zipping Required.  Can upload directly from you WindowsPowerShell\Modules folder!</a:t>
+            </a:r>
+          </a:p>
+        </p:txBody>
+      </p:sp>
+    </p:spTree>
+    <p:extLst>
+      <p:ext uri="{BB962C8B-B14F-4D97-AF65-F5344CB8AC3E}">
+        <p14:creationId xmlns:p14="http://schemas.microsoft.com/office/powerpoint/2010/main" val="262165875"/>
+      </p:ext>
+    </p:extLst>
+  </p:cSld>
+  <p:clrMapOvr>
+    <a:masterClrMapping/>
+  </p:clrMapOvr>
+  <mc:AlternateContent xmlns:mc="http://schemas.openxmlformats.org/markup-compatibility/2006" xmlns:p14="http://schemas.microsoft.com/office/powerpoint/2010/main">
+    <mc:Choice Requires="p14">
+      <p:transition spd="med" p14:dur="700">
+        <p:fade/>
+      </p:transition>
+    </mc:Choice>
+    <mc:Fallback xmlns="">
+      <p:transition spd="med">
+        <p:fade/>
+      </p:transition>
+    </mc:Fallback>
+  </mc:AlternateContent>
+</p:sld>
+</file>
+
+<file path=ppt/slides/slide42.xml><?xml version="1.0" encoding="utf-8"?>
+<p:sld xmlns:a="http://schemas.openxmlformats.org/drawingml/2006/main" xmlns:r="http://schemas.openxmlformats.org/officeDocument/2006/relationships" xmlns:p="http://schemas.openxmlformats.org/presentationml/2006/main">
+  <p:cSld>
+    <p:bg>
+      <p:bgPr>
+        <a:solidFill>
+          <a:srgbClr val="00359E"/>
+        </a:solidFill>
+        <a:effectLst/>
+      </p:bgPr>
+    </p:bg>
+    <p:spTree>
+      <p:nvGrpSpPr>
+        <p:cNvPr id="1" name=""/>
+        <p:cNvGrpSpPr/>
+        <p:nvPr/>
+      </p:nvGrpSpPr>
+      <p:grpSpPr>
+        <a:xfrm>
+          <a:off x="0" y="0"/>
+          <a:ext cx="0" cy="0"/>
+          <a:chOff x="0" y="0"/>
+          <a:chExt cx="0" cy="0"/>
+        </a:xfrm>
+      </p:grpSpPr>
+      <p:sp>
+        <p:nvSpPr>
+          <p:cNvPr id="4" name="TextBox 3">
+            <a:extLst>
+              <a:ext uri="{FF2B5EF4-FFF2-40B4-BE49-F238E27FC236}">
+                <a16:creationId xmlns:a16="http://schemas.microsoft.com/office/drawing/2014/main" id="{9C5FE0F2-C256-47F6-867A-0290E2CB9A23}"/>
+              </a:ext>
+            </a:extLst>
+          </p:cNvPr>
+          <p:cNvSpPr txBox="1"/>
+          <p:nvPr/>
+        </p:nvSpPr>
+        <p:spPr>
+          <a:xfrm>
+            <a:off x="2742917" y="107723"/>
+            <a:ext cx="6373861" cy="707886"/>
+          </a:xfrm>
+          <a:prstGeom prst="rect">
+            <a:avLst/>
+          </a:prstGeom>
+          <a:noFill/>
+        </p:spPr>
+        <p:txBody>
+          <a:bodyPr wrap="none" rtlCol="0">
+            <a:spAutoFit/>
+          </a:bodyPr>
+          <a:lstStyle/>
+          <a:p>
+            <a:r>
+              <a:rPr lang="en-US" sz="4000" dirty="0">
+                <a:latin typeface="Arial" panose="020B0604020202020204" pitchFamily="34" charset="0"/>
+                <a:cs typeface="Arial" panose="020B0604020202020204" pitchFamily="34" charset="0"/>
+              </a:rPr>
+              <a:t>Uploaded Custom Modules</a:t>
+            </a:r>
+          </a:p>
+        </p:txBody>
+      </p:sp>
+      <p:sp>
+        <p:nvSpPr>
+          <p:cNvPr id="5" name="Callout: Line 4">
+            <a:extLst>
+              <a:ext uri="{FF2B5EF4-FFF2-40B4-BE49-F238E27FC236}">
+                <a16:creationId xmlns:a16="http://schemas.microsoft.com/office/drawing/2014/main" id="{D7B195D7-339E-4BB6-A23E-4ECD78443D12}"/>
+              </a:ext>
+            </a:extLst>
+          </p:cNvPr>
+          <p:cNvSpPr/>
+          <p:nvPr/>
+        </p:nvSpPr>
+        <p:spPr>
+          <a:xfrm>
+            <a:off x="8118040" y="4998410"/>
+            <a:ext cx="1997476" cy="994299"/>
+          </a:xfrm>
+          <a:prstGeom prst="borderCallout1">
+            <a:avLst>
+              <a:gd name="adj1" fmla="val 18750"/>
+              <a:gd name="adj2" fmla="val -8333"/>
+              <a:gd name="adj3" fmla="val 86322"/>
+              <a:gd name="adj4" fmla="val -58385"/>
+            </a:avLst>
+          </a:prstGeom>
+          <a:solidFill>
+            <a:srgbClr val="7030A0"/>
+          </a:solidFill>
+          <a:ln>
+            <a:solidFill>
+              <a:schemeClr val="tx1"/>
+            </a:solidFill>
+          </a:ln>
+        </p:spPr>
+        <p:style>
+          <a:lnRef idx="2">
+            <a:schemeClr val="accent1">
+              <a:shade val="50000"/>
+            </a:schemeClr>
+          </a:lnRef>
+          <a:fillRef idx="1">
+            <a:schemeClr val="accent1"/>
+          </a:fillRef>
+          <a:effectRef idx="0">
+            <a:schemeClr val="accent1"/>
+          </a:effectRef>
+          <a:fontRef idx="minor">
+            <a:schemeClr val="lt1"/>
+          </a:fontRef>
+        </p:style>
+        <p:txBody>
+          <a:bodyPr rtlCol="0" anchor="ctr"/>
+          <a:lstStyle/>
+          <a:p>
+            <a:pPr algn="ctr"/>
+            <a:r>
+              <a:rPr lang="en-US" dirty="0"/>
+              <a:t>Module Functions Available</a:t>
+            </a:r>
+          </a:p>
+        </p:txBody>
+      </p:sp>
+      <p:pic>
+        <p:nvPicPr>
+          <p:cNvPr id="2" name="Picture 1">
+            <a:extLst>
+              <a:ext uri="{FF2B5EF4-FFF2-40B4-BE49-F238E27FC236}">
+                <a16:creationId xmlns:a16="http://schemas.microsoft.com/office/drawing/2014/main" id="{4E1B38F6-E29C-4164-A32B-0AB4167C01AE}"/>
+              </a:ext>
+            </a:extLst>
+          </p:cNvPr>
+          <p:cNvPicPr>
+            <a:picLocks noChangeAspect="1"/>
+          </p:cNvPicPr>
+          <p:nvPr/>
+        </p:nvPicPr>
+        <p:blipFill>
+          <a:blip r:embed="rId3"/>
+          <a:stretch>
+            <a:fillRect/>
+          </a:stretch>
+        </p:blipFill>
+        <p:spPr>
+          <a:xfrm>
+            <a:off x="2006609" y="1277614"/>
+            <a:ext cx="5007033" cy="5391095"/>
+          </a:xfrm>
+          <a:prstGeom prst="rect">
+            <a:avLst/>
+          </a:prstGeom>
+        </p:spPr>
+      </p:pic>
+    </p:spTree>
+    <p:extLst>
+      <p:ext uri="{BB962C8B-B14F-4D97-AF65-F5344CB8AC3E}">
+        <p14:creationId xmlns:p14="http://schemas.microsoft.com/office/powerpoint/2010/main" val="368121553"/>
+      </p:ext>
+    </p:extLst>
+  </p:cSld>
+  <p:clrMapOvr>
+    <a:masterClrMapping/>
+  </p:clrMapOvr>
+  <mc:AlternateContent xmlns:mc="http://schemas.openxmlformats.org/markup-compatibility/2006" xmlns:p14="http://schemas.microsoft.com/office/powerpoint/2010/main">
+    <mc:Choice Requires="p14">
+      <p:transition spd="med" p14:dur="700">
+        <p:fade/>
+      </p:transition>
+    </mc:Choice>
+    <mc:Fallback xmlns="">
+      <p:transition spd="med">
+        <p:fade/>
+      </p:transition>
+    </mc:Fallback>
+  </mc:AlternateContent>
+</p:sld>
+</file>
+
+<file path=ppt/slides/slide43.xml><?xml version="1.0" encoding="utf-8"?>
+<p:sld xmlns:a="http://schemas.openxmlformats.org/drawingml/2006/main" xmlns:r="http://schemas.openxmlformats.org/officeDocument/2006/relationships" xmlns:p="http://schemas.openxmlformats.org/presentationml/2006/main">
+  <p:cSld>
+    <p:spTree>
+      <p:nvGrpSpPr>
+        <p:cNvPr id="1" name=""/>
+        <p:cNvGrpSpPr/>
+        <p:nvPr/>
+      </p:nvGrpSpPr>
+      <p:grpSpPr>
+        <a:xfrm>
+          <a:off x="0" y="0"/>
+          <a:ext cx="0" cy="0"/>
+          <a:chOff x="0" y="0"/>
+          <a:chExt cx="0" cy="0"/>
+        </a:xfrm>
+      </p:grpSpPr>
+      <p:sp>
+        <p:nvSpPr>
+          <p:cNvPr id="4" name="Rectangle 3"/>
+          <p:cNvSpPr/>
+          <p:nvPr/>
+        </p:nvSpPr>
+        <p:spPr>
+          <a:xfrm>
+            <a:off x="0" y="872454"/>
+            <a:ext cx="12192000" cy="6123965"/>
+          </a:xfrm>
+          <a:prstGeom prst="rect">
+            <a:avLst/>
+          </a:prstGeom>
+          <a:solidFill>
+            <a:srgbClr val="00359E"/>
+          </a:solidFill>
+          <a:ln>
+            <a:solidFill>
+              <a:srgbClr val="00359E"/>
+            </a:solidFill>
+          </a:ln>
+        </p:spPr>
+        <p:style>
+          <a:lnRef idx="2">
+            <a:schemeClr val="accent1">
+              <a:shade val="50000"/>
+            </a:schemeClr>
+          </a:lnRef>
+          <a:fillRef idx="1">
+            <a:schemeClr val="accent1"/>
+          </a:fillRef>
+          <a:effectRef idx="0">
+            <a:schemeClr val="accent1"/>
+          </a:effectRef>
+          <a:fontRef idx="minor">
+            <a:schemeClr val="lt1"/>
+          </a:fontRef>
+        </p:style>
+        <p:txBody>
+          <a:bodyPr rtlCol="0" anchor="ctr"/>
+          <a:lstStyle/>
+          <a:p>
+            <a:pPr algn="ctr"/>
             <a:endParaRPr lang="en-US" sz="4000" dirty="0">
               <a:solidFill>
                 <a:schemeClr val="bg1"/>
@@ -20268,7 +21122,7 @@
         </p:nvSpPr>
         <p:spPr>
           <a:xfrm>
-            <a:off x="107231" y="1677927"/>
+            <a:off x="107231" y="1396037"/>
             <a:ext cx="11691244" cy="4065925"/>
           </a:xfrm>
           <a:prstGeom prst="rect">
@@ -20277,7 +21131,7 @@
         </p:spPr>
         <p:txBody>
           <a:bodyPr vert="horz" lIns="0" tIns="45720" rIns="0" bIns="45720" rtlCol="0">
-            <a:normAutofit fontScale="92500" lnSpcReduction="20000"/>
+            <a:normAutofit fontScale="85000" lnSpcReduction="10000"/>
           </a:bodyPr>
           <a:lstStyle>
             <a:lvl1pPr marL="91440" indent="-91440" algn="l" defTabSz="914400" rtl="0" eaLnBrk="1" latinLnBrk="0" hangingPunct="1">
@@ -20519,7 +21373,7 @@
               <a:buNone/>
             </a:pPr>
             <a:r>
-              <a:rPr lang="en-US" dirty="0"/>
+              <a:rPr lang="en-US" sz="3800" dirty="0"/>
               <a:t>The Case for Automation</a:t>
             </a:r>
           </a:p>
@@ -20532,7 +21386,7 @@
               <a:buNone/>
             </a:pPr>
             <a:r>
-              <a:rPr lang="en-US" dirty="0"/>
+              <a:rPr lang="en-US" sz="3800" dirty="0"/>
               <a:t>Why PowerShell?</a:t>
             </a:r>
           </a:p>
@@ -20545,7 +21399,7 @@
               <a:buNone/>
             </a:pPr>
             <a:r>
-              <a:rPr lang="en-US" dirty="0"/>
+              <a:rPr lang="en-US" sz="3800" dirty="0"/>
               <a:t>Client Side Automation</a:t>
             </a:r>
           </a:p>
@@ -20558,7 +21412,7 @@
               <a:buNone/>
             </a:pPr>
             <a:r>
-              <a:rPr lang="en-US" dirty="0"/>
+              <a:rPr lang="en-US" sz="3800" dirty="0"/>
               <a:t>Azure Side Automation</a:t>
             </a:r>
           </a:p>
@@ -20574,8 +21428,8 @@
               <a:buNone/>
             </a:pPr>
             <a:r>
-              <a:rPr lang="en-US" dirty="0"/>
-              <a:t>Bringing the Client Side and Azure Side Together</a:t>
+              <a:rPr lang="en-US" sz="3800" dirty="0"/>
+              <a:t>Client Side and Azure Side: Azure Automation Authoring Toolkit </a:t>
             </a:r>
           </a:p>
           <a:p>
@@ -20600,7 +21454,7 @@
 </p:sld>
 </file>
 
-<file path=ppt/slides/slide42.xml><?xml version="1.0" encoding="utf-8"?>
+<file path=ppt/slides/slide44.xml><?xml version="1.0" encoding="utf-8"?>
 <p:sld xmlns:a="http://schemas.openxmlformats.org/drawingml/2006/main" xmlns:r="http://schemas.openxmlformats.org/officeDocument/2006/relationships" xmlns:p="http://schemas.openxmlformats.org/presentationml/2006/main">
   <p:cSld>
     <p:spTree>

</xml_diff>